<commit_message>
add dataset & ResNet
</commit_message>
<xml_diff>
--- a/GroupProject_finalPresentation.pptx
+++ b/GroupProject_finalPresentation.pptx
@@ -7,8 +7,8 @@
   <p:sldIdLst>
     <p:sldId id="256" r:id="rId2"/>
     <p:sldId id="257" r:id="rId3"/>
-    <p:sldId id="262" r:id="rId4"/>
-    <p:sldId id="263" r:id="rId5"/>
+    <p:sldId id="274" r:id="rId4"/>
+    <p:sldId id="275" r:id="rId5"/>
     <p:sldId id="264" r:id="rId6"/>
     <p:sldId id="265" r:id="rId7"/>
     <p:sldId id="266" r:id="rId8"/>
@@ -272,7 +272,7 @@
           <a:p>
             <a:fld id="{5F9653FF-D360-4055-A1AD-EFD273E9400B}" type="datetimeFigureOut">
               <a:rPr lang="en-US" smtClean="0"/>
-              <a:t>1/29/2024</a:t>
+              <a:t>1/29/24</a:t>
             </a:fld>
             <a:endParaRPr lang="en-US"/>
           </a:p>
@@ -470,7 +470,7 @@
           <a:p>
             <a:fld id="{5F9653FF-D360-4055-A1AD-EFD273E9400B}" type="datetimeFigureOut">
               <a:rPr lang="en-US" smtClean="0"/>
-              <a:t>1/29/2024</a:t>
+              <a:t>1/29/24</a:t>
             </a:fld>
             <a:endParaRPr lang="en-US"/>
           </a:p>
@@ -678,7 +678,7 @@
           <a:p>
             <a:fld id="{5F9653FF-D360-4055-A1AD-EFD273E9400B}" type="datetimeFigureOut">
               <a:rPr lang="en-US" smtClean="0"/>
-              <a:t>1/29/2024</a:t>
+              <a:t>1/29/24</a:t>
             </a:fld>
             <a:endParaRPr lang="en-US"/>
           </a:p>
@@ -876,7 +876,7 @@
           <a:p>
             <a:fld id="{5F9653FF-D360-4055-A1AD-EFD273E9400B}" type="datetimeFigureOut">
               <a:rPr lang="en-US" smtClean="0"/>
-              <a:t>1/29/2024</a:t>
+              <a:t>1/29/24</a:t>
             </a:fld>
             <a:endParaRPr lang="en-US"/>
           </a:p>
@@ -1151,7 +1151,7 @@
           <a:p>
             <a:fld id="{5F9653FF-D360-4055-A1AD-EFD273E9400B}" type="datetimeFigureOut">
               <a:rPr lang="en-US" smtClean="0"/>
-              <a:t>1/29/2024</a:t>
+              <a:t>1/29/24</a:t>
             </a:fld>
             <a:endParaRPr lang="en-US"/>
           </a:p>
@@ -1416,7 +1416,7 @@
           <a:p>
             <a:fld id="{5F9653FF-D360-4055-A1AD-EFD273E9400B}" type="datetimeFigureOut">
               <a:rPr lang="en-US" smtClean="0"/>
-              <a:t>1/29/2024</a:t>
+              <a:t>1/29/24</a:t>
             </a:fld>
             <a:endParaRPr lang="en-US"/>
           </a:p>
@@ -1828,7 +1828,7 @@
           <a:p>
             <a:fld id="{5F9653FF-D360-4055-A1AD-EFD273E9400B}" type="datetimeFigureOut">
               <a:rPr lang="en-US" smtClean="0"/>
-              <a:t>1/29/2024</a:t>
+              <a:t>1/29/24</a:t>
             </a:fld>
             <a:endParaRPr lang="en-US"/>
           </a:p>
@@ -1969,7 +1969,7 @@
           <a:p>
             <a:fld id="{5F9653FF-D360-4055-A1AD-EFD273E9400B}" type="datetimeFigureOut">
               <a:rPr lang="en-US" smtClean="0"/>
-              <a:t>1/29/2024</a:t>
+              <a:t>1/29/24</a:t>
             </a:fld>
             <a:endParaRPr lang="en-US"/>
           </a:p>
@@ -2082,7 +2082,7 @@
           <a:p>
             <a:fld id="{5F9653FF-D360-4055-A1AD-EFD273E9400B}" type="datetimeFigureOut">
               <a:rPr lang="en-US" smtClean="0"/>
-              <a:t>1/29/2024</a:t>
+              <a:t>1/29/24</a:t>
             </a:fld>
             <a:endParaRPr lang="en-US"/>
           </a:p>
@@ -2393,7 +2393,7 @@
           <a:p>
             <a:fld id="{5F9653FF-D360-4055-A1AD-EFD273E9400B}" type="datetimeFigureOut">
               <a:rPr lang="en-US" smtClean="0"/>
-              <a:t>1/29/2024</a:t>
+              <a:t>1/29/24</a:t>
             </a:fld>
             <a:endParaRPr lang="en-US"/>
           </a:p>
@@ -2681,7 +2681,7 @@
           <a:p>
             <a:fld id="{5F9653FF-D360-4055-A1AD-EFD273E9400B}" type="datetimeFigureOut">
               <a:rPr lang="en-US" smtClean="0"/>
-              <a:t>1/29/2024</a:t>
+              <a:t>1/29/24</a:t>
             </a:fld>
             <a:endParaRPr lang="en-US"/>
           </a:p>
@@ -2922,7 +2922,7 @@
           <a:p>
             <a:fld id="{5F9653FF-D360-4055-A1AD-EFD273E9400B}" type="datetimeFigureOut">
               <a:rPr lang="en-US" smtClean="0"/>
-              <a:t>1/29/2024</a:t>
+              <a:t>1/29/24</a:t>
             </a:fld>
             <a:endParaRPr lang="en-US"/>
           </a:p>
@@ -3432,7 +3432,7 @@
             </a:r>
             <a:r>
               <a:rPr lang="de-DE" sz="4400" dirty="0"/>
-              <a:t> Cancer Image Data Classification</a:t>
+              <a:t> Cancer Image Classification</a:t>
             </a:r>
             <a:br>
               <a:rPr lang="de-DE" sz="4400" dirty="0"/>
@@ -3471,7 +3471,7 @@
           <a:p>
             <a:r>
               <a:rPr lang="de-DE" dirty="0"/>
-              <a:t>Group Q: Jana Hoffmann, Jessy </a:t>
+              <a:t>Group Q: Jana Hoffmann, Jessie </a:t>
             </a:r>
             <a:r>
               <a:rPr lang="de-DE" dirty="0" err="1"/>
@@ -5780,34 +5780,6 @@
       </p:sp>
       <p:sp>
         <p:nvSpPr>
-          <p:cNvPr id="6" name="Content Placeholder 5">
-            <a:extLst>
-              <a:ext uri="{FF2B5EF4-FFF2-40B4-BE49-F238E27FC236}">
-                <a16:creationId xmlns:a16="http://schemas.microsoft.com/office/drawing/2014/main" id="{5E120946-ABB7-63E8-2A48-60399C36549B}"/>
-              </a:ext>
-            </a:extLst>
-          </p:cNvPr>
-          <p:cNvSpPr>
-            <a:spLocks noGrp="1"/>
-          </p:cNvSpPr>
-          <p:nvPr>
-            <p:ph idx="1"/>
-          </p:nvPr>
-        </p:nvSpPr>
-        <p:spPr/>
-        <p:txBody>
-          <a:bodyPr/>
-          <a:lstStyle/>
-          <a:p>
-            <a:pPr marL="0" indent="0">
-              <a:buNone/>
-            </a:pPr>
-            <a:endParaRPr lang="en-US" dirty="0"/>
-          </a:p>
-        </p:txBody>
-      </p:sp>
-      <p:sp>
-        <p:nvSpPr>
           <p:cNvPr id="3" name="Rectangle: Rounded Corners 2">
             <a:extLst>
               <a:ext uri="{FF2B5EF4-FFF2-40B4-BE49-F238E27FC236}">
@@ -5866,10 +5838,192 @@
           </a:p>
         </p:txBody>
       </p:sp>
+      <p:sp>
+        <p:nvSpPr>
+          <p:cNvPr id="4" name="Content Placeholder 5">
+            <a:extLst>
+              <a:ext uri="{FF2B5EF4-FFF2-40B4-BE49-F238E27FC236}">
+                <a16:creationId xmlns:a16="http://schemas.microsoft.com/office/drawing/2014/main" id="{D63FA5D8-3E78-7F6C-740F-F3144F97F7DF}"/>
+              </a:ext>
+            </a:extLst>
+          </p:cNvPr>
+          <p:cNvSpPr>
+            <a:spLocks noGrp="1"/>
+          </p:cNvSpPr>
+          <p:nvPr>
+            <p:ph idx="1"/>
+          </p:nvPr>
+        </p:nvSpPr>
+        <p:spPr/>
+        <p:txBody>
+          <a:bodyPr/>
+          <a:lstStyle/>
+          <a:p>
+            <a:r>
+              <a:rPr lang="en-US" dirty="0"/>
+              <a:t>CBIS-DDSM</a:t>
+            </a:r>
+          </a:p>
+          <a:p>
+            <a:pPr lvl="1"/>
+            <a:r>
+              <a:rPr lang="en-US" dirty="0"/>
+              <a:t>753 calcification cases</a:t>
+            </a:r>
+          </a:p>
+          <a:p>
+            <a:pPr lvl="2"/>
+            <a:r>
+              <a:rPr lang="en-US" dirty="0"/>
+              <a:t>414 benign</a:t>
+            </a:r>
+          </a:p>
+          <a:p>
+            <a:pPr lvl="2"/>
+            <a:r>
+              <a:rPr lang="en-US" dirty="0"/>
+              <a:t>339 malignant</a:t>
+            </a:r>
+          </a:p>
+          <a:p>
+            <a:pPr lvl="1"/>
+            <a:r>
+              <a:rPr lang="en-US" dirty="0"/>
+              <a:t>891 mass cases</a:t>
+            </a:r>
+          </a:p>
+          <a:p>
+            <a:pPr lvl="2"/>
+            <a:r>
+              <a:rPr lang="en-US" dirty="0"/>
+              <a:t>472 benign</a:t>
+            </a:r>
+          </a:p>
+          <a:p>
+            <a:pPr lvl="2"/>
+            <a:r>
+              <a:rPr lang="en-US" dirty="0"/>
+              <a:t>419 malignant</a:t>
+            </a:r>
+          </a:p>
+        </p:txBody>
+      </p:sp>
+      <p:pic>
+        <p:nvPicPr>
+          <p:cNvPr id="5" name="Picture 4">
+            <a:extLst>
+              <a:ext uri="{FF2B5EF4-FFF2-40B4-BE49-F238E27FC236}">
+                <a16:creationId xmlns:a16="http://schemas.microsoft.com/office/drawing/2014/main" id="{9C973056-A1F2-BB9F-7C26-CFF4261EE0B2}"/>
+              </a:ext>
+            </a:extLst>
+          </p:cNvPr>
+          <p:cNvPicPr>
+            <a:picLocks noChangeAspect="1"/>
+          </p:cNvPicPr>
+          <p:nvPr/>
+        </p:nvPicPr>
+        <p:blipFill>
+          <a:blip r:embed="rId2"/>
+          <a:stretch>
+            <a:fillRect/>
+          </a:stretch>
+        </p:blipFill>
+        <p:spPr>
+          <a:xfrm>
+            <a:off x="1482968" y="4464783"/>
+            <a:ext cx="9010148" cy="2143613"/>
+          </a:xfrm>
+          <a:prstGeom prst="rect">
+            <a:avLst/>
+          </a:prstGeom>
+        </p:spPr>
+      </p:pic>
+      <p:sp>
+        <p:nvSpPr>
+          <p:cNvPr id="7" name="TextBox 6">
+            <a:extLst>
+              <a:ext uri="{FF2B5EF4-FFF2-40B4-BE49-F238E27FC236}">
+                <a16:creationId xmlns:a16="http://schemas.microsoft.com/office/drawing/2014/main" id="{F6C7BDED-B0E1-D543-85D5-E9C6C0E32F7D}"/>
+              </a:ext>
+            </a:extLst>
+          </p:cNvPr>
+          <p:cNvSpPr txBox="1"/>
+          <p:nvPr/>
+        </p:nvSpPr>
+        <p:spPr>
+          <a:xfrm>
+            <a:off x="1576753" y="6561504"/>
+            <a:ext cx="1579984" cy="276999"/>
+          </a:xfrm>
+          <a:prstGeom prst="rect">
+            <a:avLst/>
+          </a:prstGeom>
+          <a:noFill/>
+        </p:spPr>
+        <p:txBody>
+          <a:bodyPr wrap="none" rtlCol="0">
+            <a:spAutoFit/>
+          </a:bodyPr>
+          <a:lstStyle/>
+          <a:p>
+            <a:r>
+              <a:rPr lang="en-ZA" sz="1200" dirty="0">
+                <a:solidFill>
+                  <a:schemeClr val="bg1">
+                    <a:lumMod val="50000"/>
+                  </a:schemeClr>
+                </a:solidFill>
+                <a:effectLst/>
+              </a:rPr>
+              <a:t>(</a:t>
+            </a:r>
+            <a:r>
+              <a:rPr lang="en-ZA" sz="1200" dirty="0" err="1">
+                <a:solidFill>
+                  <a:schemeClr val="bg1">
+                    <a:lumMod val="50000"/>
+                  </a:schemeClr>
+                </a:solidFill>
+                <a:effectLst/>
+              </a:rPr>
+              <a:t>Montaha</a:t>
+            </a:r>
+            <a:r>
+              <a:rPr lang="en-ZA" sz="1200" dirty="0">
+                <a:solidFill>
+                  <a:schemeClr val="bg1">
+                    <a:lumMod val="50000"/>
+                  </a:schemeClr>
+                </a:solidFill>
+                <a:effectLst/>
+              </a:rPr>
+              <a:t> </a:t>
+            </a:r>
+            <a:r>
+              <a:rPr lang="en-US" sz="1200" dirty="0">
+                <a:solidFill>
+                  <a:schemeClr val="bg1">
+                    <a:lumMod val="50000"/>
+                  </a:schemeClr>
+                </a:solidFill>
+                <a:effectLst/>
+              </a:rPr>
+              <a:t>et al., 2021)</a:t>
+            </a:r>
+            <a:endParaRPr lang="en-ZA" sz="1200" dirty="0">
+              <a:solidFill>
+                <a:schemeClr val="bg1">
+                  <a:lumMod val="50000"/>
+                </a:schemeClr>
+              </a:solidFill>
+            </a:endParaRPr>
+          </a:p>
+        </p:txBody>
+      </p:sp>
     </p:spTree>
     <p:extLst>
       <p:ext uri="{BB962C8B-B14F-4D97-AF65-F5344CB8AC3E}">
-        <p14:creationId xmlns:p14="http://schemas.microsoft.com/office/powerpoint/2010/main" val="3670903543"/>
+        <p14:creationId xmlns:p14="http://schemas.microsoft.com/office/powerpoint/2010/main" val="1513007351"/>
       </p:ext>
     </p:extLst>
   </p:cSld>
@@ -5898,74 +6052,10 @@
       </p:grpSpPr>
       <p:sp>
         <p:nvSpPr>
-          <p:cNvPr id="2" name="Title 1">
-            <a:extLst>
-              <a:ext uri="{FF2B5EF4-FFF2-40B4-BE49-F238E27FC236}">
-                <a16:creationId xmlns:a16="http://schemas.microsoft.com/office/drawing/2014/main" id="{53BBAD25-1F9B-788B-2603-6402BBCF694C}"/>
-              </a:ext>
-            </a:extLst>
-          </p:cNvPr>
-          <p:cNvSpPr>
-            <a:spLocks noGrp="1"/>
-          </p:cNvSpPr>
-          <p:nvPr>
-            <p:ph type="title"/>
-          </p:nvPr>
-        </p:nvSpPr>
-        <p:spPr/>
-        <p:txBody>
-          <a:bodyPr/>
-          <a:lstStyle/>
-          <a:p>
-            <a:r>
-              <a:rPr lang="de-DE" dirty="0"/>
-              <a:t>Models</a:t>
-            </a:r>
-            <a:br>
-              <a:rPr lang="de-DE" dirty="0"/>
-            </a:br>
-            <a:r>
-              <a:rPr lang="de-DE" dirty="0"/>
-              <a:t>ResNet50</a:t>
-            </a:r>
-            <a:endParaRPr lang="en-US" dirty="0"/>
-          </a:p>
-        </p:txBody>
-      </p:sp>
-      <p:sp>
-        <p:nvSpPr>
-          <p:cNvPr id="6" name="Content Placeholder 5">
-            <a:extLst>
-              <a:ext uri="{FF2B5EF4-FFF2-40B4-BE49-F238E27FC236}">
-                <a16:creationId xmlns:a16="http://schemas.microsoft.com/office/drawing/2014/main" id="{5E120946-ABB7-63E8-2A48-60399C36549B}"/>
-              </a:ext>
-            </a:extLst>
-          </p:cNvPr>
-          <p:cNvSpPr>
-            <a:spLocks noGrp="1"/>
-          </p:cNvSpPr>
-          <p:nvPr>
-            <p:ph idx="1"/>
-          </p:nvPr>
-        </p:nvSpPr>
-        <p:spPr/>
-        <p:txBody>
-          <a:bodyPr/>
-          <a:lstStyle/>
-          <a:p>
-            <a:pPr marL="0" indent="0">
-              <a:buNone/>
-            </a:pPr>
-            <a:endParaRPr lang="en-US" dirty="0"/>
-          </a:p>
-        </p:txBody>
-      </p:sp>
-      <p:sp>
-        <p:nvSpPr>
-          <p:cNvPr id="3" name="Rectangle: Rounded Corners 2">
-            <a:extLst>
-              <a:ext uri="{FF2B5EF4-FFF2-40B4-BE49-F238E27FC236}">
-                <a16:creationId xmlns:a16="http://schemas.microsoft.com/office/drawing/2014/main" id="{4AF6311D-D296-C3D0-7C8D-08EB7AFDC29B}"/>
+          <p:cNvPr id="56" name="Rectangle: Rounded Corners 20">
+            <a:extLst>
+              <a:ext uri="{FF2B5EF4-FFF2-40B4-BE49-F238E27FC236}">
+                <a16:creationId xmlns:a16="http://schemas.microsoft.com/office/drawing/2014/main" id="{683FB62A-83BA-E003-8DE9-983799AC0735}"/>
               </a:ext>
             </a:extLst>
           </p:cNvPr>
@@ -5974,21 +6064,21 @@
         </p:nvSpPr>
         <p:spPr>
           <a:xfrm>
-            <a:off x="0" y="1712437"/>
-            <a:ext cx="8845420" cy="45719"/>
+            <a:off x="2435179" y="2527196"/>
+            <a:ext cx="303807" cy="2165173"/>
           </a:xfrm>
           <a:prstGeom prst="roundRect">
             <a:avLst/>
           </a:prstGeom>
           <a:solidFill>
-            <a:schemeClr val="accent5">
+            <a:schemeClr val="accent2">
               <a:lumMod val="40000"/>
               <a:lumOff val="60000"/>
             </a:schemeClr>
           </a:solidFill>
           <a:ln>
             <a:solidFill>
-              <a:schemeClr val="accent5">
+              <a:schemeClr val="accent2">
                 <a:lumMod val="40000"/>
                 <a:lumOff val="60000"/>
               </a:schemeClr>
@@ -6016,14 +6106,2074 @@
           <a:lstStyle/>
           <a:p>
             <a:pPr algn="ctr"/>
+            <a:endParaRPr lang="en-US" dirty="0"/>
+          </a:p>
+        </p:txBody>
+      </p:sp>
+      <p:sp>
+        <p:nvSpPr>
+          <p:cNvPr id="2" name="Title 1">
+            <a:extLst>
+              <a:ext uri="{FF2B5EF4-FFF2-40B4-BE49-F238E27FC236}">
+                <a16:creationId xmlns:a16="http://schemas.microsoft.com/office/drawing/2014/main" id="{53BBAD25-1F9B-788B-2603-6402BBCF694C}"/>
+              </a:ext>
+            </a:extLst>
+          </p:cNvPr>
+          <p:cNvSpPr>
+            <a:spLocks noGrp="1"/>
+          </p:cNvSpPr>
+          <p:nvPr>
+            <p:ph type="title"/>
+          </p:nvPr>
+        </p:nvSpPr>
+        <p:spPr/>
+        <p:txBody>
+          <a:bodyPr/>
+          <a:lstStyle/>
+          <a:p>
+            <a:r>
+              <a:rPr lang="de-DE" dirty="0"/>
+              <a:t>Models</a:t>
+            </a:r>
+            <a:br>
+              <a:rPr lang="de-DE" dirty="0"/>
+            </a:br>
+            <a:r>
+              <a:rPr lang="de-DE" dirty="0"/>
+              <a:t>ResNet50</a:t>
+            </a:r>
+            <a:endParaRPr lang="en-US" dirty="0"/>
+          </a:p>
+        </p:txBody>
+      </p:sp>
+      <p:sp>
+        <p:nvSpPr>
+          <p:cNvPr id="3" name="Rectangle: Rounded Corners 2">
+            <a:extLst>
+              <a:ext uri="{FF2B5EF4-FFF2-40B4-BE49-F238E27FC236}">
+                <a16:creationId xmlns:a16="http://schemas.microsoft.com/office/drawing/2014/main" id="{4AF6311D-D296-C3D0-7C8D-08EB7AFDC29B}"/>
+              </a:ext>
+            </a:extLst>
+          </p:cNvPr>
+          <p:cNvSpPr/>
+          <p:nvPr/>
+        </p:nvSpPr>
+        <p:spPr>
+          <a:xfrm>
+            <a:off x="0" y="1712437"/>
+            <a:ext cx="8845420" cy="45719"/>
+          </a:xfrm>
+          <a:prstGeom prst="roundRect">
+            <a:avLst/>
+          </a:prstGeom>
+          <a:solidFill>
+            <a:schemeClr val="accent5">
+              <a:lumMod val="40000"/>
+              <a:lumOff val="60000"/>
+            </a:schemeClr>
+          </a:solidFill>
+          <a:ln>
+            <a:solidFill>
+              <a:schemeClr val="accent5">
+                <a:lumMod val="40000"/>
+                <a:lumOff val="60000"/>
+              </a:schemeClr>
+            </a:solidFill>
+          </a:ln>
+        </p:spPr>
+        <p:style>
+          <a:lnRef idx="2">
+            <a:schemeClr val="accent1">
+              <a:shade val="15000"/>
+            </a:schemeClr>
+          </a:lnRef>
+          <a:fillRef idx="1">
+            <a:schemeClr val="accent1"/>
+          </a:fillRef>
+          <a:effectRef idx="0">
+            <a:schemeClr val="accent1"/>
+          </a:effectRef>
+          <a:fontRef idx="minor">
+            <a:schemeClr val="lt1"/>
+          </a:fontRef>
+        </p:style>
+        <p:txBody>
+          <a:bodyPr rtlCol="0" anchor="ctr"/>
+          <a:lstStyle/>
+          <a:p>
+            <a:pPr algn="ctr"/>
             <a:endParaRPr lang="en-US"/>
+          </a:p>
+        </p:txBody>
+      </p:sp>
+      <p:sp>
+        <p:nvSpPr>
+          <p:cNvPr id="4" name="Rectangle: Rounded Corners 3">
+            <a:extLst>
+              <a:ext uri="{FF2B5EF4-FFF2-40B4-BE49-F238E27FC236}">
+                <a16:creationId xmlns:a16="http://schemas.microsoft.com/office/drawing/2014/main" id="{72E3A346-66ED-ED7D-73E9-917E8065310B}"/>
+              </a:ext>
+            </a:extLst>
+          </p:cNvPr>
+          <p:cNvSpPr/>
+          <p:nvPr/>
+        </p:nvSpPr>
+        <p:spPr>
+          <a:xfrm>
+            <a:off x="287528" y="2528467"/>
+            <a:ext cx="303807" cy="2165173"/>
+          </a:xfrm>
+          <a:prstGeom prst="roundRect">
+            <a:avLst/>
+          </a:prstGeom>
+          <a:solidFill>
+            <a:schemeClr val="accent3">
+              <a:lumMod val="40000"/>
+              <a:lumOff val="60000"/>
+            </a:schemeClr>
+          </a:solidFill>
+          <a:ln>
+            <a:solidFill>
+              <a:schemeClr val="accent3">
+                <a:lumMod val="40000"/>
+                <a:lumOff val="60000"/>
+              </a:schemeClr>
+            </a:solidFill>
+          </a:ln>
+        </p:spPr>
+        <p:style>
+          <a:lnRef idx="2">
+            <a:schemeClr val="accent1">
+              <a:shade val="15000"/>
+            </a:schemeClr>
+          </a:lnRef>
+          <a:fillRef idx="1">
+            <a:schemeClr val="accent1"/>
+          </a:fillRef>
+          <a:effectRef idx="0">
+            <a:schemeClr val="accent1"/>
+          </a:effectRef>
+          <a:fontRef idx="minor">
+            <a:schemeClr val="lt1"/>
+          </a:fontRef>
+        </p:style>
+        <p:txBody>
+          <a:bodyPr rtlCol="0" anchor="ctr"/>
+          <a:lstStyle/>
+          <a:p>
+            <a:pPr algn="ctr"/>
+            <a:endParaRPr lang="en-US" dirty="0"/>
+          </a:p>
+        </p:txBody>
+      </p:sp>
+      <p:sp>
+        <p:nvSpPr>
+          <p:cNvPr id="5" name="TextBox 4">
+            <a:extLst>
+              <a:ext uri="{FF2B5EF4-FFF2-40B4-BE49-F238E27FC236}">
+                <a16:creationId xmlns:a16="http://schemas.microsoft.com/office/drawing/2014/main" id="{C2795C19-D459-6DCB-1CA3-B684672EC6A5}"/>
+              </a:ext>
+            </a:extLst>
+          </p:cNvPr>
+          <p:cNvSpPr txBox="1"/>
+          <p:nvPr/>
+        </p:nvSpPr>
+        <p:spPr>
+          <a:xfrm rot="16200000">
+            <a:off x="-172976" y="3450123"/>
+            <a:ext cx="1222453" cy="369332"/>
+          </a:xfrm>
+          <a:prstGeom prst="rect">
+            <a:avLst/>
+          </a:prstGeom>
+          <a:noFill/>
+        </p:spPr>
+        <p:txBody>
+          <a:bodyPr wrap="square" rtlCol="0">
+            <a:spAutoFit/>
+          </a:bodyPr>
+          <a:lstStyle/>
+          <a:p>
+            <a:r>
+              <a:rPr lang="de-DE" dirty="0" err="1"/>
+              <a:t>InputLayer</a:t>
+            </a:r>
+            <a:endParaRPr lang="en-US" dirty="0"/>
+          </a:p>
+        </p:txBody>
+      </p:sp>
+      <p:sp>
+        <p:nvSpPr>
+          <p:cNvPr id="7" name="Rectangle: Rounded Corners 14">
+            <a:extLst>
+              <a:ext uri="{FF2B5EF4-FFF2-40B4-BE49-F238E27FC236}">
+                <a16:creationId xmlns:a16="http://schemas.microsoft.com/office/drawing/2014/main" id="{15706B33-1BB6-49C9-6820-E089FB674E88}"/>
+              </a:ext>
+            </a:extLst>
+          </p:cNvPr>
+          <p:cNvSpPr/>
+          <p:nvPr/>
+        </p:nvSpPr>
+        <p:spPr>
+          <a:xfrm>
+            <a:off x="1171510" y="2527196"/>
+            <a:ext cx="303807" cy="2165173"/>
+          </a:xfrm>
+          <a:prstGeom prst="roundRect">
+            <a:avLst/>
+          </a:prstGeom>
+          <a:solidFill>
+            <a:schemeClr val="accent5">
+              <a:lumMod val="40000"/>
+              <a:lumOff val="60000"/>
+            </a:schemeClr>
+          </a:solidFill>
+          <a:ln>
+            <a:solidFill>
+              <a:schemeClr val="accent5">
+                <a:lumMod val="40000"/>
+                <a:lumOff val="60000"/>
+              </a:schemeClr>
+            </a:solidFill>
+          </a:ln>
+        </p:spPr>
+        <p:style>
+          <a:lnRef idx="2">
+            <a:schemeClr val="accent1">
+              <a:shade val="15000"/>
+            </a:schemeClr>
+          </a:lnRef>
+          <a:fillRef idx="1">
+            <a:schemeClr val="accent1"/>
+          </a:fillRef>
+          <a:effectRef idx="0">
+            <a:schemeClr val="accent1"/>
+          </a:effectRef>
+          <a:fontRef idx="minor">
+            <a:schemeClr val="lt1"/>
+          </a:fontRef>
+        </p:style>
+        <p:txBody>
+          <a:bodyPr rtlCol="0" anchor="ctr"/>
+          <a:lstStyle/>
+          <a:p>
+            <a:pPr algn="ctr"/>
+            <a:endParaRPr lang="en-US" dirty="0"/>
+          </a:p>
+        </p:txBody>
+      </p:sp>
+      <p:sp>
+        <p:nvSpPr>
+          <p:cNvPr id="8" name="TextBox 7">
+            <a:extLst>
+              <a:ext uri="{FF2B5EF4-FFF2-40B4-BE49-F238E27FC236}">
+                <a16:creationId xmlns:a16="http://schemas.microsoft.com/office/drawing/2014/main" id="{4E28D740-2370-3190-5776-A74FF0C45556}"/>
+              </a:ext>
+            </a:extLst>
+          </p:cNvPr>
+          <p:cNvSpPr txBox="1"/>
+          <p:nvPr/>
+        </p:nvSpPr>
+        <p:spPr>
+          <a:xfrm rot="16200000">
+            <a:off x="877760" y="3448851"/>
+            <a:ext cx="939941" cy="369332"/>
+          </a:xfrm>
+          <a:prstGeom prst="rect">
+            <a:avLst/>
+          </a:prstGeom>
+          <a:noFill/>
+        </p:spPr>
+        <p:txBody>
+          <a:bodyPr wrap="square" rtlCol="0">
+            <a:spAutoFit/>
+          </a:bodyPr>
+          <a:lstStyle/>
+          <a:p>
+            <a:r>
+              <a:rPr lang="de-DE" dirty="0"/>
+              <a:t>Conv2D</a:t>
+            </a:r>
+            <a:endParaRPr lang="en-US" dirty="0"/>
+          </a:p>
+        </p:txBody>
+      </p:sp>
+      <p:sp>
+        <p:nvSpPr>
+          <p:cNvPr id="9" name="Rectangle: Rounded Corners 16">
+            <a:extLst>
+              <a:ext uri="{FF2B5EF4-FFF2-40B4-BE49-F238E27FC236}">
+                <a16:creationId xmlns:a16="http://schemas.microsoft.com/office/drawing/2014/main" id="{25FF092C-15BB-E167-6F91-68B629742FFA}"/>
+              </a:ext>
+            </a:extLst>
+          </p:cNvPr>
+          <p:cNvSpPr/>
+          <p:nvPr/>
+        </p:nvSpPr>
+        <p:spPr>
+          <a:xfrm>
+            <a:off x="1589502" y="2527196"/>
+            <a:ext cx="303807" cy="2165173"/>
+          </a:xfrm>
+          <a:prstGeom prst="roundRect">
+            <a:avLst/>
+          </a:prstGeom>
+          <a:solidFill>
+            <a:schemeClr val="accent6">
+              <a:lumMod val="40000"/>
+              <a:lumOff val="60000"/>
+            </a:schemeClr>
+          </a:solidFill>
+          <a:ln>
+            <a:noFill/>
+          </a:ln>
+        </p:spPr>
+        <p:style>
+          <a:lnRef idx="2">
+            <a:schemeClr val="accent1">
+              <a:shade val="15000"/>
+            </a:schemeClr>
+          </a:lnRef>
+          <a:fillRef idx="1">
+            <a:schemeClr val="accent1"/>
+          </a:fillRef>
+          <a:effectRef idx="0">
+            <a:schemeClr val="accent1"/>
+          </a:effectRef>
+          <a:fontRef idx="minor">
+            <a:schemeClr val="lt1"/>
+          </a:fontRef>
+        </p:style>
+        <p:txBody>
+          <a:bodyPr rtlCol="0" anchor="ctr"/>
+          <a:lstStyle/>
+          <a:p>
+            <a:pPr algn="ctr"/>
+            <a:endParaRPr lang="en-US" dirty="0">
+              <a:solidFill>
+                <a:schemeClr val="accent6">
+                  <a:lumMod val="20000"/>
+                  <a:lumOff val="80000"/>
+                </a:schemeClr>
+              </a:solidFill>
+            </a:endParaRPr>
+          </a:p>
+        </p:txBody>
+      </p:sp>
+      <p:sp>
+        <p:nvSpPr>
+          <p:cNvPr id="10" name="TextBox 9">
+            <a:extLst>
+              <a:ext uri="{FF2B5EF4-FFF2-40B4-BE49-F238E27FC236}">
+                <a16:creationId xmlns:a16="http://schemas.microsoft.com/office/drawing/2014/main" id="{657F59F5-0FD0-5BA4-A772-05F665458B02}"/>
+              </a:ext>
+            </a:extLst>
+          </p:cNvPr>
+          <p:cNvSpPr txBox="1"/>
+          <p:nvPr/>
+        </p:nvSpPr>
+        <p:spPr>
+          <a:xfrm rot="16200000">
+            <a:off x="1107197" y="3437390"/>
+            <a:ext cx="1315513" cy="369332"/>
+          </a:xfrm>
+          <a:prstGeom prst="rect">
+            <a:avLst/>
+          </a:prstGeom>
+          <a:noFill/>
+        </p:spPr>
+        <p:txBody>
+          <a:bodyPr wrap="square" rtlCol="0">
+            <a:spAutoFit/>
+          </a:bodyPr>
+          <a:lstStyle/>
+          <a:p>
+            <a:pPr algn="ctr"/>
+            <a:r>
+              <a:rPr lang="de-DE" dirty="0" err="1"/>
+              <a:t>BatchNorm</a:t>
+            </a:r>
+            <a:endParaRPr lang="en-US" dirty="0"/>
+          </a:p>
+        </p:txBody>
+      </p:sp>
+      <p:sp>
+        <p:nvSpPr>
+          <p:cNvPr id="11" name="Rectangle: Rounded Corners 20">
+            <a:extLst>
+              <a:ext uri="{FF2B5EF4-FFF2-40B4-BE49-F238E27FC236}">
+                <a16:creationId xmlns:a16="http://schemas.microsoft.com/office/drawing/2014/main" id="{7888DA1B-27BD-AE0D-FD2C-AC165695C80E}"/>
+              </a:ext>
+            </a:extLst>
+          </p:cNvPr>
+          <p:cNvSpPr/>
+          <p:nvPr/>
+        </p:nvSpPr>
+        <p:spPr>
+          <a:xfrm>
+            <a:off x="2013054" y="2527196"/>
+            <a:ext cx="303807" cy="2165173"/>
+          </a:xfrm>
+          <a:prstGeom prst="roundRect">
+            <a:avLst/>
+          </a:prstGeom>
+          <a:solidFill>
+            <a:schemeClr val="accent6">
+              <a:lumMod val="40000"/>
+              <a:lumOff val="60000"/>
+            </a:schemeClr>
+          </a:solidFill>
+          <a:ln>
+            <a:noFill/>
+          </a:ln>
+        </p:spPr>
+        <p:style>
+          <a:lnRef idx="2">
+            <a:schemeClr val="accent1">
+              <a:shade val="15000"/>
+            </a:schemeClr>
+          </a:lnRef>
+          <a:fillRef idx="1">
+            <a:schemeClr val="accent1"/>
+          </a:fillRef>
+          <a:effectRef idx="0">
+            <a:schemeClr val="accent1"/>
+          </a:effectRef>
+          <a:fontRef idx="minor">
+            <a:schemeClr val="lt1"/>
+          </a:fontRef>
+        </p:style>
+        <p:txBody>
+          <a:bodyPr rtlCol="0" anchor="ctr"/>
+          <a:lstStyle/>
+          <a:p>
+            <a:pPr algn="ctr"/>
+            <a:endParaRPr lang="en-US" dirty="0">
+              <a:solidFill>
+                <a:schemeClr val="accent4">
+                  <a:lumMod val="40000"/>
+                  <a:lumOff val="60000"/>
+                </a:schemeClr>
+              </a:solidFill>
+            </a:endParaRPr>
+          </a:p>
+        </p:txBody>
+      </p:sp>
+      <p:sp>
+        <p:nvSpPr>
+          <p:cNvPr id="12" name="TextBox 11">
+            <a:extLst>
+              <a:ext uri="{FF2B5EF4-FFF2-40B4-BE49-F238E27FC236}">
+                <a16:creationId xmlns:a16="http://schemas.microsoft.com/office/drawing/2014/main" id="{00A5203F-BA7E-E697-3C19-FE55BB3E8769}"/>
+              </a:ext>
+            </a:extLst>
+          </p:cNvPr>
+          <p:cNvSpPr txBox="1"/>
+          <p:nvPr/>
+        </p:nvSpPr>
+        <p:spPr>
+          <a:xfrm rot="16200000">
+            <a:off x="1784434" y="3448847"/>
+            <a:ext cx="1591355" cy="369332"/>
+          </a:xfrm>
+          <a:prstGeom prst="rect">
+            <a:avLst/>
+          </a:prstGeom>
+          <a:noFill/>
+        </p:spPr>
+        <p:txBody>
+          <a:bodyPr wrap="square" rtlCol="0">
+            <a:spAutoFit/>
+          </a:bodyPr>
+          <a:lstStyle/>
+          <a:p>
+            <a:pPr algn="ctr"/>
+            <a:r>
+              <a:rPr lang="de-DE" dirty="0"/>
+              <a:t>MaxPooling2D</a:t>
+            </a:r>
+            <a:endParaRPr lang="en-US" dirty="0"/>
+          </a:p>
+        </p:txBody>
+      </p:sp>
+      <p:sp>
+        <p:nvSpPr>
+          <p:cNvPr id="13" name="TextBox 12">
+            <a:extLst>
+              <a:ext uri="{FF2B5EF4-FFF2-40B4-BE49-F238E27FC236}">
+                <a16:creationId xmlns:a16="http://schemas.microsoft.com/office/drawing/2014/main" id="{CF4AE925-0557-75FB-BAB3-4A9054EDF57E}"/>
+              </a:ext>
+            </a:extLst>
+          </p:cNvPr>
+          <p:cNvSpPr txBox="1"/>
+          <p:nvPr/>
+        </p:nvSpPr>
+        <p:spPr>
+          <a:xfrm>
+            <a:off x="1481922" y="4740404"/>
+            <a:ext cx="867610" cy="369332"/>
+          </a:xfrm>
+          <a:prstGeom prst="rect">
+            <a:avLst/>
+          </a:prstGeom>
+          <a:noFill/>
+        </p:spPr>
+        <p:txBody>
+          <a:bodyPr wrap="none" rtlCol="0">
+            <a:spAutoFit/>
+          </a:bodyPr>
+          <a:lstStyle/>
+          <a:p>
+            <a:r>
+              <a:rPr lang="de-DE" dirty="0"/>
+              <a:t>Stage 1</a:t>
+            </a:r>
+            <a:endParaRPr lang="en-US" dirty="0"/>
+          </a:p>
+        </p:txBody>
+      </p:sp>
+      <p:sp>
+        <p:nvSpPr>
+          <p:cNvPr id="14" name="TextBox 13">
+            <a:extLst>
+              <a:ext uri="{FF2B5EF4-FFF2-40B4-BE49-F238E27FC236}">
+                <a16:creationId xmlns:a16="http://schemas.microsoft.com/office/drawing/2014/main" id="{B712FB6E-706C-368A-247B-B64A10BED323}"/>
+              </a:ext>
+            </a:extLst>
+          </p:cNvPr>
+          <p:cNvSpPr txBox="1"/>
+          <p:nvPr/>
+        </p:nvSpPr>
+        <p:spPr>
+          <a:xfrm>
+            <a:off x="3238856" y="4750471"/>
+            <a:ext cx="867610" cy="369332"/>
+          </a:xfrm>
+          <a:prstGeom prst="rect">
+            <a:avLst/>
+          </a:prstGeom>
+          <a:noFill/>
+        </p:spPr>
+        <p:txBody>
+          <a:bodyPr wrap="none" rtlCol="0">
+            <a:spAutoFit/>
+          </a:bodyPr>
+          <a:lstStyle/>
+          <a:p>
+            <a:r>
+              <a:rPr lang="de-DE" dirty="0"/>
+              <a:t>Stage 2</a:t>
+            </a:r>
+            <a:endParaRPr lang="en-US" dirty="0"/>
+          </a:p>
+        </p:txBody>
+      </p:sp>
+      <p:sp>
+        <p:nvSpPr>
+          <p:cNvPr id="15" name="TextBox 14">
+            <a:extLst>
+              <a:ext uri="{FF2B5EF4-FFF2-40B4-BE49-F238E27FC236}">
+                <a16:creationId xmlns:a16="http://schemas.microsoft.com/office/drawing/2014/main" id="{44E2DFC9-9913-A8CD-4270-0BD86C0C7122}"/>
+              </a:ext>
+            </a:extLst>
+          </p:cNvPr>
+          <p:cNvSpPr txBox="1"/>
+          <p:nvPr/>
+        </p:nvSpPr>
+        <p:spPr>
+          <a:xfrm>
+            <a:off x="4526557" y="4752234"/>
+            <a:ext cx="867610" cy="369332"/>
+          </a:xfrm>
+          <a:prstGeom prst="rect">
+            <a:avLst/>
+          </a:prstGeom>
+          <a:noFill/>
+        </p:spPr>
+        <p:txBody>
+          <a:bodyPr wrap="none" rtlCol="0">
+            <a:spAutoFit/>
+          </a:bodyPr>
+          <a:lstStyle/>
+          <a:p>
+            <a:r>
+              <a:rPr lang="de-DE" dirty="0"/>
+              <a:t>Stage 3</a:t>
+            </a:r>
+            <a:endParaRPr lang="en-US" dirty="0"/>
+          </a:p>
+        </p:txBody>
+      </p:sp>
+      <p:sp>
+        <p:nvSpPr>
+          <p:cNvPr id="16" name="TextBox 15">
+            <a:extLst>
+              <a:ext uri="{FF2B5EF4-FFF2-40B4-BE49-F238E27FC236}">
+                <a16:creationId xmlns:a16="http://schemas.microsoft.com/office/drawing/2014/main" id="{BB56918F-1B0A-8738-6E33-5EAD0607EE3D}"/>
+              </a:ext>
+            </a:extLst>
+          </p:cNvPr>
+          <p:cNvSpPr txBox="1"/>
+          <p:nvPr/>
+        </p:nvSpPr>
+        <p:spPr>
+          <a:xfrm>
+            <a:off x="5884392" y="4749479"/>
+            <a:ext cx="867610" cy="369332"/>
+          </a:xfrm>
+          <a:prstGeom prst="rect">
+            <a:avLst/>
+          </a:prstGeom>
+          <a:noFill/>
+        </p:spPr>
+        <p:txBody>
+          <a:bodyPr wrap="none" rtlCol="0">
+            <a:spAutoFit/>
+          </a:bodyPr>
+          <a:lstStyle/>
+          <a:p>
+            <a:r>
+              <a:rPr lang="de-DE" dirty="0"/>
+              <a:t>Stage 4</a:t>
+            </a:r>
+            <a:endParaRPr lang="en-US" dirty="0"/>
+          </a:p>
+        </p:txBody>
+      </p:sp>
+      <p:sp>
+        <p:nvSpPr>
+          <p:cNvPr id="17" name="TextBox 16">
+            <a:extLst>
+              <a:ext uri="{FF2B5EF4-FFF2-40B4-BE49-F238E27FC236}">
+                <a16:creationId xmlns:a16="http://schemas.microsoft.com/office/drawing/2014/main" id="{1A931DA1-ACFE-29D0-969F-3159645F6259}"/>
+              </a:ext>
+            </a:extLst>
+          </p:cNvPr>
+          <p:cNvSpPr txBox="1"/>
+          <p:nvPr/>
+        </p:nvSpPr>
+        <p:spPr>
+          <a:xfrm>
+            <a:off x="7125145" y="4739326"/>
+            <a:ext cx="867610" cy="369332"/>
+          </a:xfrm>
+          <a:prstGeom prst="rect">
+            <a:avLst/>
+          </a:prstGeom>
+          <a:noFill/>
+        </p:spPr>
+        <p:txBody>
+          <a:bodyPr wrap="none" rtlCol="0">
+            <a:spAutoFit/>
+          </a:bodyPr>
+          <a:lstStyle/>
+          <a:p>
+            <a:r>
+              <a:rPr lang="de-DE" dirty="0"/>
+              <a:t>Stage 5</a:t>
+            </a:r>
+            <a:endParaRPr lang="en-US" dirty="0"/>
+          </a:p>
+        </p:txBody>
+      </p:sp>
+      <p:sp>
+        <p:nvSpPr>
+          <p:cNvPr id="18" name="Rectangle: Rounded Corners 63">
+            <a:extLst>
+              <a:ext uri="{FF2B5EF4-FFF2-40B4-BE49-F238E27FC236}">
+                <a16:creationId xmlns:a16="http://schemas.microsoft.com/office/drawing/2014/main" id="{EDAA7007-C75C-5776-0C2D-FCE8FA0BDE27}"/>
+              </a:ext>
+            </a:extLst>
+          </p:cNvPr>
+          <p:cNvSpPr/>
+          <p:nvPr/>
+        </p:nvSpPr>
+        <p:spPr>
+          <a:xfrm>
+            <a:off x="3296954" y="2525249"/>
+            <a:ext cx="303807" cy="2165173"/>
+          </a:xfrm>
+          <a:prstGeom prst="roundRect">
+            <a:avLst/>
+          </a:prstGeom>
+          <a:solidFill>
+            <a:schemeClr val="accent5">
+              <a:lumMod val="40000"/>
+              <a:lumOff val="60000"/>
+            </a:schemeClr>
+          </a:solidFill>
+          <a:ln>
+            <a:solidFill>
+              <a:schemeClr val="accent5">
+                <a:lumMod val="40000"/>
+                <a:lumOff val="60000"/>
+              </a:schemeClr>
+            </a:solidFill>
+          </a:ln>
+        </p:spPr>
+        <p:style>
+          <a:lnRef idx="2">
+            <a:schemeClr val="accent1">
+              <a:shade val="15000"/>
+            </a:schemeClr>
+          </a:lnRef>
+          <a:fillRef idx="1">
+            <a:schemeClr val="accent1"/>
+          </a:fillRef>
+          <a:effectRef idx="0">
+            <a:schemeClr val="accent1"/>
+          </a:effectRef>
+          <a:fontRef idx="minor">
+            <a:schemeClr val="lt1"/>
+          </a:fontRef>
+        </p:style>
+        <p:txBody>
+          <a:bodyPr rtlCol="0" anchor="ctr"/>
+          <a:lstStyle/>
+          <a:p>
+            <a:pPr algn="ctr"/>
+            <a:endParaRPr lang="en-US" dirty="0"/>
+          </a:p>
+        </p:txBody>
+      </p:sp>
+      <p:sp>
+        <p:nvSpPr>
+          <p:cNvPr id="19" name="TextBox 18">
+            <a:extLst>
+              <a:ext uri="{FF2B5EF4-FFF2-40B4-BE49-F238E27FC236}">
+                <a16:creationId xmlns:a16="http://schemas.microsoft.com/office/drawing/2014/main" id="{F8FBBBE3-AF9B-4E7D-028E-212BDCDD7476}"/>
+              </a:ext>
+            </a:extLst>
+          </p:cNvPr>
+          <p:cNvSpPr txBox="1"/>
+          <p:nvPr/>
+        </p:nvSpPr>
+        <p:spPr>
+          <a:xfrm rot="16200000">
+            <a:off x="2796248" y="3468857"/>
+            <a:ext cx="1305218" cy="369332"/>
+          </a:xfrm>
+          <a:prstGeom prst="rect">
+            <a:avLst/>
+          </a:prstGeom>
+          <a:noFill/>
+        </p:spPr>
+        <p:txBody>
+          <a:bodyPr wrap="square" rtlCol="0">
+            <a:spAutoFit/>
+          </a:bodyPr>
+          <a:lstStyle/>
+          <a:p>
+            <a:pPr algn="ctr"/>
+            <a:r>
+              <a:rPr lang="de-DE" dirty="0" err="1"/>
+              <a:t>ConvBlock</a:t>
+            </a:r>
+            <a:endParaRPr lang="en-US" dirty="0"/>
+          </a:p>
+        </p:txBody>
+      </p:sp>
+      <p:sp>
+        <p:nvSpPr>
+          <p:cNvPr id="22" name="Rectangle: Rounded Corners 67">
+            <a:extLst>
+              <a:ext uri="{FF2B5EF4-FFF2-40B4-BE49-F238E27FC236}">
+                <a16:creationId xmlns:a16="http://schemas.microsoft.com/office/drawing/2014/main" id="{8E172B84-7E13-F901-9A4C-EAD12CE68C7D}"/>
+              </a:ext>
+            </a:extLst>
+          </p:cNvPr>
+          <p:cNvSpPr/>
+          <p:nvPr/>
+        </p:nvSpPr>
+        <p:spPr>
+          <a:xfrm>
+            <a:off x="3705424" y="2537522"/>
+            <a:ext cx="303807" cy="2165173"/>
+          </a:xfrm>
+          <a:prstGeom prst="roundRect">
+            <a:avLst/>
+          </a:prstGeom>
+          <a:solidFill>
+            <a:schemeClr val="accent4">
+              <a:lumMod val="40000"/>
+              <a:lumOff val="60000"/>
+            </a:schemeClr>
+          </a:solidFill>
+          <a:ln>
+            <a:noFill/>
+          </a:ln>
+        </p:spPr>
+        <p:style>
+          <a:lnRef idx="2">
+            <a:schemeClr val="accent1">
+              <a:shade val="15000"/>
+            </a:schemeClr>
+          </a:lnRef>
+          <a:fillRef idx="1">
+            <a:schemeClr val="accent1"/>
+          </a:fillRef>
+          <a:effectRef idx="0">
+            <a:schemeClr val="accent1"/>
+          </a:effectRef>
+          <a:fontRef idx="minor">
+            <a:schemeClr val="lt1"/>
+          </a:fontRef>
+        </p:style>
+        <p:txBody>
+          <a:bodyPr rtlCol="0" anchor="ctr"/>
+          <a:lstStyle/>
+          <a:p>
+            <a:pPr algn="ctr"/>
+            <a:endParaRPr lang="en-US" dirty="0">
+              <a:solidFill>
+                <a:schemeClr val="accent1">
+                  <a:lumMod val="40000"/>
+                  <a:lumOff val="60000"/>
+                </a:schemeClr>
+              </a:solidFill>
+            </a:endParaRPr>
+          </a:p>
+        </p:txBody>
+      </p:sp>
+      <p:sp>
+        <p:nvSpPr>
+          <p:cNvPr id="23" name="TextBox 22">
+            <a:extLst>
+              <a:ext uri="{FF2B5EF4-FFF2-40B4-BE49-F238E27FC236}">
+                <a16:creationId xmlns:a16="http://schemas.microsoft.com/office/drawing/2014/main" id="{C0803557-5524-10F5-B0BD-3F8238608643}"/>
+              </a:ext>
+            </a:extLst>
+          </p:cNvPr>
+          <p:cNvSpPr txBox="1"/>
+          <p:nvPr/>
+        </p:nvSpPr>
+        <p:spPr>
+          <a:xfrm rot="16200000">
+            <a:off x="3061650" y="3435441"/>
+            <a:ext cx="1591355" cy="369332"/>
+          </a:xfrm>
+          <a:prstGeom prst="rect">
+            <a:avLst/>
+          </a:prstGeom>
+          <a:noFill/>
+        </p:spPr>
+        <p:txBody>
+          <a:bodyPr wrap="square" rtlCol="0">
+            <a:spAutoFit/>
+          </a:bodyPr>
+          <a:lstStyle/>
+          <a:p>
+            <a:pPr algn="ctr"/>
+            <a:r>
+              <a:rPr lang="de-DE" dirty="0"/>
+              <a:t>ID Block x 2</a:t>
+            </a:r>
+            <a:endParaRPr lang="en-US" dirty="0"/>
+          </a:p>
+        </p:txBody>
+      </p:sp>
+      <p:sp>
+        <p:nvSpPr>
+          <p:cNvPr id="48" name="Rectangle: Rounded Corners 97">
+            <a:extLst>
+              <a:ext uri="{FF2B5EF4-FFF2-40B4-BE49-F238E27FC236}">
+                <a16:creationId xmlns:a16="http://schemas.microsoft.com/office/drawing/2014/main" id="{741EC1A8-7FF3-5D1C-22C3-D0E7099143E5}"/>
+              </a:ext>
+            </a:extLst>
+          </p:cNvPr>
+          <p:cNvSpPr/>
+          <p:nvPr/>
+        </p:nvSpPr>
+        <p:spPr>
+          <a:xfrm>
+            <a:off x="9344771" y="2563765"/>
+            <a:ext cx="303807" cy="2165173"/>
+          </a:xfrm>
+          <a:prstGeom prst="roundRect">
+            <a:avLst/>
+          </a:prstGeom>
+          <a:solidFill>
+            <a:schemeClr val="accent5">
+              <a:lumMod val="40000"/>
+              <a:lumOff val="60000"/>
+            </a:schemeClr>
+          </a:solidFill>
+          <a:ln>
+            <a:solidFill>
+              <a:schemeClr val="accent5">
+                <a:lumMod val="40000"/>
+                <a:lumOff val="60000"/>
+              </a:schemeClr>
+            </a:solidFill>
+          </a:ln>
+        </p:spPr>
+        <p:style>
+          <a:lnRef idx="2">
+            <a:schemeClr val="accent1">
+              <a:shade val="15000"/>
+            </a:schemeClr>
+          </a:lnRef>
+          <a:fillRef idx="1">
+            <a:schemeClr val="accent1"/>
+          </a:fillRef>
+          <a:effectRef idx="0">
+            <a:schemeClr val="accent1"/>
+          </a:effectRef>
+          <a:fontRef idx="minor">
+            <a:schemeClr val="lt1"/>
+          </a:fontRef>
+        </p:style>
+        <p:txBody>
+          <a:bodyPr rtlCol="0" anchor="ctr"/>
+          <a:lstStyle/>
+          <a:p>
+            <a:pPr algn="ctr"/>
+            <a:endParaRPr lang="en-US" dirty="0"/>
+          </a:p>
+        </p:txBody>
+      </p:sp>
+      <p:sp>
+        <p:nvSpPr>
+          <p:cNvPr id="49" name="TextBox 48">
+            <a:extLst>
+              <a:ext uri="{FF2B5EF4-FFF2-40B4-BE49-F238E27FC236}">
+                <a16:creationId xmlns:a16="http://schemas.microsoft.com/office/drawing/2014/main" id="{56A26E7A-9D80-624E-E546-4001AFFBC239}"/>
+              </a:ext>
+            </a:extLst>
+          </p:cNvPr>
+          <p:cNvSpPr txBox="1"/>
+          <p:nvPr/>
+        </p:nvSpPr>
+        <p:spPr>
+          <a:xfrm rot="16200000">
+            <a:off x="8551369" y="3460869"/>
+            <a:ext cx="1889721" cy="369332"/>
+          </a:xfrm>
+          <a:prstGeom prst="rect">
+            <a:avLst/>
+          </a:prstGeom>
+          <a:noFill/>
+        </p:spPr>
+        <p:txBody>
+          <a:bodyPr wrap="square" rtlCol="0">
+            <a:spAutoFit/>
+          </a:bodyPr>
+          <a:lstStyle/>
+          <a:p>
+            <a:pPr algn="ctr"/>
+            <a:r>
+              <a:rPr lang="de-DE" dirty="0"/>
+              <a:t>Fully </a:t>
+            </a:r>
+            <a:r>
+              <a:rPr lang="de-DE" dirty="0" err="1"/>
+              <a:t>Connected</a:t>
+            </a:r>
+            <a:endParaRPr lang="en-US" dirty="0"/>
+          </a:p>
+        </p:txBody>
+      </p:sp>
+      <p:sp>
+        <p:nvSpPr>
+          <p:cNvPr id="50" name="Rectangle: Rounded Corners 99">
+            <a:extLst>
+              <a:ext uri="{FF2B5EF4-FFF2-40B4-BE49-F238E27FC236}">
+                <a16:creationId xmlns:a16="http://schemas.microsoft.com/office/drawing/2014/main" id="{4FC10DF5-3C04-7FB9-D021-AD1E375FEED6}"/>
+              </a:ext>
+            </a:extLst>
+          </p:cNvPr>
+          <p:cNvSpPr/>
+          <p:nvPr/>
+        </p:nvSpPr>
+        <p:spPr>
+          <a:xfrm>
+            <a:off x="10049923" y="2538369"/>
+            <a:ext cx="303807" cy="2165173"/>
+          </a:xfrm>
+          <a:prstGeom prst="roundRect">
+            <a:avLst/>
+          </a:prstGeom>
+          <a:solidFill>
+            <a:schemeClr val="accent2">
+              <a:lumMod val="40000"/>
+              <a:lumOff val="60000"/>
+            </a:schemeClr>
+          </a:solidFill>
+          <a:ln>
+            <a:solidFill>
+              <a:schemeClr val="accent2">
+                <a:lumMod val="40000"/>
+                <a:lumOff val="60000"/>
+              </a:schemeClr>
+            </a:solidFill>
+          </a:ln>
+        </p:spPr>
+        <p:style>
+          <a:lnRef idx="2">
+            <a:schemeClr val="accent1">
+              <a:shade val="15000"/>
+            </a:schemeClr>
+          </a:lnRef>
+          <a:fillRef idx="1">
+            <a:schemeClr val="accent1"/>
+          </a:fillRef>
+          <a:effectRef idx="0">
+            <a:schemeClr val="accent1"/>
+          </a:effectRef>
+          <a:fontRef idx="minor">
+            <a:schemeClr val="lt1"/>
+          </a:fontRef>
+        </p:style>
+        <p:txBody>
+          <a:bodyPr rtlCol="0" anchor="ctr"/>
+          <a:lstStyle/>
+          <a:p>
+            <a:pPr algn="ctr"/>
+            <a:endParaRPr lang="en-US" dirty="0">
+              <a:solidFill>
+                <a:schemeClr val="accent1">
+                  <a:lumMod val="40000"/>
+                  <a:lumOff val="60000"/>
+                </a:schemeClr>
+              </a:solidFill>
+            </a:endParaRPr>
+          </a:p>
+        </p:txBody>
+      </p:sp>
+      <p:sp>
+        <p:nvSpPr>
+          <p:cNvPr id="51" name="TextBox 50">
+            <a:extLst>
+              <a:ext uri="{FF2B5EF4-FFF2-40B4-BE49-F238E27FC236}">
+                <a16:creationId xmlns:a16="http://schemas.microsoft.com/office/drawing/2014/main" id="{2F1FF7A2-AF91-A1CB-6C4B-5FAACCC19F65}"/>
+              </a:ext>
+            </a:extLst>
+          </p:cNvPr>
+          <p:cNvSpPr txBox="1"/>
+          <p:nvPr/>
+        </p:nvSpPr>
+        <p:spPr>
+          <a:xfrm rot="16200000">
+            <a:off x="9491549" y="3230014"/>
+            <a:ext cx="1420554" cy="369332"/>
+          </a:xfrm>
+          <a:prstGeom prst="rect">
+            <a:avLst/>
+          </a:prstGeom>
+          <a:noFill/>
+        </p:spPr>
+        <p:txBody>
+          <a:bodyPr wrap="square" rtlCol="0">
+            <a:spAutoFit/>
+          </a:bodyPr>
+          <a:lstStyle/>
+          <a:p>
+            <a:r>
+              <a:rPr lang="de-DE" dirty="0" err="1"/>
+              <a:t>Softmax</a:t>
+            </a:r>
+            <a:endParaRPr lang="en-US" dirty="0"/>
+          </a:p>
+        </p:txBody>
+      </p:sp>
+      <p:sp>
+        <p:nvSpPr>
+          <p:cNvPr id="52" name="Rectangle: Rounded Corners 101">
+            <a:extLst>
+              <a:ext uri="{FF2B5EF4-FFF2-40B4-BE49-F238E27FC236}">
+                <a16:creationId xmlns:a16="http://schemas.microsoft.com/office/drawing/2014/main" id="{BE05105F-88D4-77B9-A1F5-808F49814A38}"/>
+              </a:ext>
+            </a:extLst>
+          </p:cNvPr>
+          <p:cNvSpPr/>
+          <p:nvPr/>
+        </p:nvSpPr>
+        <p:spPr>
+          <a:xfrm>
+            <a:off x="10781553" y="2527802"/>
+            <a:ext cx="1038840" cy="2178110"/>
+          </a:xfrm>
+          <a:prstGeom prst="roundRect">
+            <a:avLst/>
+          </a:prstGeom>
+          <a:solidFill>
+            <a:schemeClr val="accent3">
+              <a:lumMod val="40000"/>
+              <a:lumOff val="60000"/>
+            </a:schemeClr>
+          </a:solidFill>
+          <a:ln>
+            <a:solidFill>
+              <a:schemeClr val="accent3">
+                <a:lumMod val="40000"/>
+                <a:lumOff val="60000"/>
+              </a:schemeClr>
+            </a:solidFill>
+          </a:ln>
+        </p:spPr>
+        <p:style>
+          <a:lnRef idx="2">
+            <a:schemeClr val="accent1">
+              <a:shade val="15000"/>
+            </a:schemeClr>
+          </a:lnRef>
+          <a:fillRef idx="1">
+            <a:schemeClr val="accent1"/>
+          </a:fillRef>
+          <a:effectRef idx="0">
+            <a:schemeClr val="accent1"/>
+          </a:effectRef>
+          <a:fontRef idx="minor">
+            <a:schemeClr val="lt1"/>
+          </a:fontRef>
+        </p:style>
+        <p:txBody>
+          <a:bodyPr rtlCol="0" anchor="ctr"/>
+          <a:lstStyle/>
+          <a:p>
+            <a:pPr algn="ctr"/>
+            <a:endParaRPr lang="en-US" dirty="0"/>
+          </a:p>
+        </p:txBody>
+      </p:sp>
+      <p:cxnSp>
+        <p:nvCxnSpPr>
+          <p:cNvPr id="53" name="Straight Connector 52">
+            <a:extLst>
+              <a:ext uri="{FF2B5EF4-FFF2-40B4-BE49-F238E27FC236}">
+                <a16:creationId xmlns:a16="http://schemas.microsoft.com/office/drawing/2014/main" id="{C4E0D6BA-9DCD-DC64-AE66-9EDBC8BAC36D}"/>
+              </a:ext>
+            </a:extLst>
+          </p:cNvPr>
+          <p:cNvCxnSpPr>
+            <a:cxnSpLocks/>
+          </p:cNvCxnSpPr>
+          <p:nvPr/>
+        </p:nvCxnSpPr>
+        <p:spPr>
+          <a:xfrm>
+            <a:off x="10901915" y="3366072"/>
+            <a:ext cx="798116" cy="561975"/>
+          </a:xfrm>
+          <a:prstGeom prst="line">
+            <a:avLst/>
+          </a:prstGeom>
+          <a:ln w="28575">
+            <a:solidFill>
+              <a:schemeClr val="tx1"/>
+            </a:solidFill>
+          </a:ln>
+        </p:spPr>
+        <p:style>
+          <a:lnRef idx="1">
+            <a:schemeClr val="accent1"/>
+          </a:lnRef>
+          <a:fillRef idx="0">
+            <a:schemeClr val="accent1"/>
+          </a:fillRef>
+          <a:effectRef idx="0">
+            <a:schemeClr val="accent1"/>
+          </a:effectRef>
+          <a:fontRef idx="minor">
+            <a:schemeClr val="tx1"/>
+          </a:fontRef>
+        </p:style>
+      </p:cxnSp>
+      <p:sp>
+        <p:nvSpPr>
+          <p:cNvPr id="54" name="TextBox 53">
+            <a:extLst>
+              <a:ext uri="{FF2B5EF4-FFF2-40B4-BE49-F238E27FC236}">
+                <a16:creationId xmlns:a16="http://schemas.microsoft.com/office/drawing/2014/main" id="{314BBE00-289E-1FA0-3503-2041BF008397}"/>
+              </a:ext>
+            </a:extLst>
+          </p:cNvPr>
+          <p:cNvSpPr txBox="1"/>
+          <p:nvPr/>
+        </p:nvSpPr>
+        <p:spPr>
+          <a:xfrm>
+            <a:off x="10730062" y="4049737"/>
+            <a:ext cx="1177119" cy="369332"/>
+          </a:xfrm>
+          <a:prstGeom prst="rect">
+            <a:avLst/>
+          </a:prstGeom>
+          <a:noFill/>
+        </p:spPr>
+        <p:txBody>
+          <a:bodyPr wrap="square" rtlCol="0">
+            <a:spAutoFit/>
+          </a:bodyPr>
+          <a:lstStyle/>
+          <a:p>
+            <a:r>
+              <a:rPr lang="de-DE" dirty="0" err="1"/>
+              <a:t>malignant</a:t>
+            </a:r>
+            <a:endParaRPr lang="en-US" dirty="0"/>
+          </a:p>
+        </p:txBody>
+      </p:sp>
+      <p:sp>
+        <p:nvSpPr>
+          <p:cNvPr id="55" name="TextBox 54">
+            <a:extLst>
+              <a:ext uri="{FF2B5EF4-FFF2-40B4-BE49-F238E27FC236}">
+                <a16:creationId xmlns:a16="http://schemas.microsoft.com/office/drawing/2014/main" id="{1D2A1826-ED01-6233-1603-EF95E91946E1}"/>
+              </a:ext>
+            </a:extLst>
+          </p:cNvPr>
+          <p:cNvSpPr txBox="1"/>
+          <p:nvPr/>
+        </p:nvSpPr>
+        <p:spPr>
+          <a:xfrm>
+            <a:off x="10877622" y="2811813"/>
+            <a:ext cx="1177119" cy="369332"/>
+          </a:xfrm>
+          <a:prstGeom prst="rect">
+            <a:avLst/>
+          </a:prstGeom>
+          <a:noFill/>
+        </p:spPr>
+        <p:txBody>
+          <a:bodyPr wrap="square" rtlCol="0">
+            <a:spAutoFit/>
+          </a:bodyPr>
+          <a:lstStyle/>
+          <a:p>
+            <a:r>
+              <a:rPr lang="de-DE" dirty="0" err="1"/>
+              <a:t>benign</a:t>
+            </a:r>
+            <a:endParaRPr lang="en-US" dirty="0"/>
+          </a:p>
+        </p:txBody>
+      </p:sp>
+      <p:sp>
+        <p:nvSpPr>
+          <p:cNvPr id="57" name="TextBox 56">
+            <a:extLst>
+              <a:ext uri="{FF2B5EF4-FFF2-40B4-BE49-F238E27FC236}">
+                <a16:creationId xmlns:a16="http://schemas.microsoft.com/office/drawing/2014/main" id="{9CE26AE8-94C7-7264-5292-D467BCA09337}"/>
+              </a:ext>
+            </a:extLst>
+          </p:cNvPr>
+          <p:cNvSpPr txBox="1"/>
+          <p:nvPr/>
+        </p:nvSpPr>
+        <p:spPr>
+          <a:xfrm rot="16200000">
+            <a:off x="1506167" y="3448848"/>
+            <a:ext cx="1315513" cy="369332"/>
+          </a:xfrm>
+          <a:prstGeom prst="rect">
+            <a:avLst/>
+          </a:prstGeom>
+          <a:noFill/>
+        </p:spPr>
+        <p:txBody>
+          <a:bodyPr wrap="square" rtlCol="0">
+            <a:spAutoFit/>
+          </a:bodyPr>
+          <a:lstStyle/>
+          <a:p>
+            <a:pPr algn="ctr"/>
+            <a:r>
+              <a:rPr lang="de-DE" dirty="0" err="1"/>
+              <a:t>ReLu</a:t>
+            </a:r>
+            <a:endParaRPr lang="en-US" dirty="0"/>
+          </a:p>
+        </p:txBody>
+      </p:sp>
+      <p:sp>
+        <p:nvSpPr>
+          <p:cNvPr id="58" name="Rectangle: Rounded Corners 63">
+            <a:extLst>
+              <a:ext uri="{FF2B5EF4-FFF2-40B4-BE49-F238E27FC236}">
+                <a16:creationId xmlns:a16="http://schemas.microsoft.com/office/drawing/2014/main" id="{9B513159-C39E-A00A-8E50-FE48DF6C3F56}"/>
+              </a:ext>
+            </a:extLst>
+          </p:cNvPr>
+          <p:cNvSpPr/>
+          <p:nvPr/>
+        </p:nvSpPr>
+        <p:spPr>
+          <a:xfrm>
+            <a:off x="4623793" y="2538157"/>
+            <a:ext cx="303807" cy="2165173"/>
+          </a:xfrm>
+          <a:prstGeom prst="roundRect">
+            <a:avLst/>
+          </a:prstGeom>
+          <a:solidFill>
+            <a:schemeClr val="accent5">
+              <a:lumMod val="40000"/>
+              <a:lumOff val="60000"/>
+            </a:schemeClr>
+          </a:solidFill>
+          <a:ln>
+            <a:solidFill>
+              <a:schemeClr val="accent5">
+                <a:lumMod val="40000"/>
+                <a:lumOff val="60000"/>
+              </a:schemeClr>
+            </a:solidFill>
+          </a:ln>
+        </p:spPr>
+        <p:style>
+          <a:lnRef idx="2">
+            <a:schemeClr val="accent1">
+              <a:shade val="15000"/>
+            </a:schemeClr>
+          </a:lnRef>
+          <a:fillRef idx="1">
+            <a:schemeClr val="accent1"/>
+          </a:fillRef>
+          <a:effectRef idx="0">
+            <a:schemeClr val="accent1"/>
+          </a:effectRef>
+          <a:fontRef idx="minor">
+            <a:schemeClr val="lt1"/>
+          </a:fontRef>
+        </p:style>
+        <p:txBody>
+          <a:bodyPr rtlCol="0" anchor="ctr"/>
+          <a:lstStyle/>
+          <a:p>
+            <a:pPr algn="ctr"/>
+            <a:endParaRPr lang="en-US" dirty="0"/>
+          </a:p>
+        </p:txBody>
+      </p:sp>
+      <p:sp>
+        <p:nvSpPr>
+          <p:cNvPr id="59" name="TextBox 58">
+            <a:extLst>
+              <a:ext uri="{FF2B5EF4-FFF2-40B4-BE49-F238E27FC236}">
+                <a16:creationId xmlns:a16="http://schemas.microsoft.com/office/drawing/2014/main" id="{3BC5CB8E-CC2F-65A4-B000-F9038429BDE1}"/>
+              </a:ext>
+            </a:extLst>
+          </p:cNvPr>
+          <p:cNvSpPr txBox="1"/>
+          <p:nvPr/>
+        </p:nvSpPr>
+        <p:spPr>
+          <a:xfrm rot="16200000">
+            <a:off x="4123087" y="3481765"/>
+            <a:ext cx="1305218" cy="369332"/>
+          </a:xfrm>
+          <a:prstGeom prst="rect">
+            <a:avLst/>
+          </a:prstGeom>
+          <a:noFill/>
+        </p:spPr>
+        <p:txBody>
+          <a:bodyPr wrap="square" rtlCol="0">
+            <a:spAutoFit/>
+          </a:bodyPr>
+          <a:lstStyle/>
+          <a:p>
+            <a:pPr algn="ctr"/>
+            <a:r>
+              <a:rPr lang="de-DE" dirty="0" err="1"/>
+              <a:t>ConvBlock</a:t>
+            </a:r>
+            <a:endParaRPr lang="en-US" dirty="0"/>
+          </a:p>
+        </p:txBody>
+      </p:sp>
+      <p:sp>
+        <p:nvSpPr>
+          <p:cNvPr id="60" name="Rectangle: Rounded Corners 67">
+            <a:extLst>
+              <a:ext uri="{FF2B5EF4-FFF2-40B4-BE49-F238E27FC236}">
+                <a16:creationId xmlns:a16="http://schemas.microsoft.com/office/drawing/2014/main" id="{054CD1F1-45C6-59BD-FE38-180D04AE5A64}"/>
+              </a:ext>
+            </a:extLst>
+          </p:cNvPr>
+          <p:cNvSpPr/>
+          <p:nvPr/>
+        </p:nvSpPr>
+        <p:spPr>
+          <a:xfrm>
+            <a:off x="5032263" y="2550430"/>
+            <a:ext cx="303807" cy="2165173"/>
+          </a:xfrm>
+          <a:prstGeom prst="roundRect">
+            <a:avLst/>
+          </a:prstGeom>
+          <a:solidFill>
+            <a:schemeClr val="accent4">
+              <a:lumMod val="40000"/>
+              <a:lumOff val="60000"/>
+            </a:schemeClr>
+          </a:solidFill>
+          <a:ln>
+            <a:noFill/>
+          </a:ln>
+        </p:spPr>
+        <p:style>
+          <a:lnRef idx="2">
+            <a:schemeClr val="accent1">
+              <a:shade val="15000"/>
+            </a:schemeClr>
+          </a:lnRef>
+          <a:fillRef idx="1">
+            <a:schemeClr val="accent1"/>
+          </a:fillRef>
+          <a:effectRef idx="0">
+            <a:schemeClr val="accent1"/>
+          </a:effectRef>
+          <a:fontRef idx="minor">
+            <a:schemeClr val="lt1"/>
+          </a:fontRef>
+        </p:style>
+        <p:txBody>
+          <a:bodyPr rtlCol="0" anchor="ctr"/>
+          <a:lstStyle/>
+          <a:p>
+            <a:pPr algn="ctr"/>
+            <a:endParaRPr lang="en-US" dirty="0">
+              <a:solidFill>
+                <a:schemeClr val="accent1">
+                  <a:lumMod val="40000"/>
+                  <a:lumOff val="60000"/>
+                </a:schemeClr>
+              </a:solidFill>
+            </a:endParaRPr>
+          </a:p>
+        </p:txBody>
+      </p:sp>
+      <p:sp>
+        <p:nvSpPr>
+          <p:cNvPr id="61" name="TextBox 60">
+            <a:extLst>
+              <a:ext uri="{FF2B5EF4-FFF2-40B4-BE49-F238E27FC236}">
+                <a16:creationId xmlns:a16="http://schemas.microsoft.com/office/drawing/2014/main" id="{276F9670-CF2A-4E90-73B0-91EB4835B8B2}"/>
+              </a:ext>
+            </a:extLst>
+          </p:cNvPr>
+          <p:cNvSpPr txBox="1"/>
+          <p:nvPr/>
+        </p:nvSpPr>
+        <p:spPr>
+          <a:xfrm rot="16200000">
+            <a:off x="4388489" y="3448349"/>
+            <a:ext cx="1591355" cy="369332"/>
+          </a:xfrm>
+          <a:prstGeom prst="rect">
+            <a:avLst/>
+          </a:prstGeom>
+          <a:noFill/>
+        </p:spPr>
+        <p:txBody>
+          <a:bodyPr wrap="square" rtlCol="0">
+            <a:spAutoFit/>
+          </a:bodyPr>
+          <a:lstStyle/>
+          <a:p>
+            <a:pPr algn="ctr"/>
+            <a:r>
+              <a:rPr lang="de-DE" dirty="0"/>
+              <a:t>ID Block x 3</a:t>
+            </a:r>
+            <a:endParaRPr lang="en-US" dirty="0"/>
+          </a:p>
+        </p:txBody>
+      </p:sp>
+      <p:sp>
+        <p:nvSpPr>
+          <p:cNvPr id="62" name="Rectangle: Rounded Corners 63">
+            <a:extLst>
+              <a:ext uri="{FF2B5EF4-FFF2-40B4-BE49-F238E27FC236}">
+                <a16:creationId xmlns:a16="http://schemas.microsoft.com/office/drawing/2014/main" id="{B1CD881D-5185-424B-C548-CB47901439D8}"/>
+              </a:ext>
+            </a:extLst>
+          </p:cNvPr>
+          <p:cNvSpPr/>
+          <p:nvPr/>
+        </p:nvSpPr>
+        <p:spPr>
+          <a:xfrm>
+            <a:off x="5943113" y="2525249"/>
+            <a:ext cx="303807" cy="2165173"/>
+          </a:xfrm>
+          <a:prstGeom prst="roundRect">
+            <a:avLst/>
+          </a:prstGeom>
+          <a:solidFill>
+            <a:schemeClr val="accent5">
+              <a:lumMod val="40000"/>
+              <a:lumOff val="60000"/>
+            </a:schemeClr>
+          </a:solidFill>
+          <a:ln>
+            <a:solidFill>
+              <a:schemeClr val="accent5">
+                <a:lumMod val="40000"/>
+                <a:lumOff val="60000"/>
+              </a:schemeClr>
+            </a:solidFill>
+          </a:ln>
+        </p:spPr>
+        <p:style>
+          <a:lnRef idx="2">
+            <a:schemeClr val="accent1">
+              <a:shade val="15000"/>
+            </a:schemeClr>
+          </a:lnRef>
+          <a:fillRef idx="1">
+            <a:schemeClr val="accent1"/>
+          </a:fillRef>
+          <a:effectRef idx="0">
+            <a:schemeClr val="accent1"/>
+          </a:effectRef>
+          <a:fontRef idx="minor">
+            <a:schemeClr val="lt1"/>
+          </a:fontRef>
+        </p:style>
+        <p:txBody>
+          <a:bodyPr rtlCol="0" anchor="ctr"/>
+          <a:lstStyle/>
+          <a:p>
+            <a:pPr algn="ctr"/>
+            <a:endParaRPr lang="en-US" dirty="0"/>
+          </a:p>
+        </p:txBody>
+      </p:sp>
+      <p:sp>
+        <p:nvSpPr>
+          <p:cNvPr id="63" name="TextBox 62">
+            <a:extLst>
+              <a:ext uri="{FF2B5EF4-FFF2-40B4-BE49-F238E27FC236}">
+                <a16:creationId xmlns:a16="http://schemas.microsoft.com/office/drawing/2014/main" id="{9A23DC9B-9AD2-12F8-7678-826C3395248A}"/>
+              </a:ext>
+            </a:extLst>
+          </p:cNvPr>
+          <p:cNvSpPr txBox="1"/>
+          <p:nvPr/>
+        </p:nvSpPr>
+        <p:spPr>
+          <a:xfrm rot="16200000">
+            <a:off x="5442407" y="3468857"/>
+            <a:ext cx="1305218" cy="369332"/>
+          </a:xfrm>
+          <a:prstGeom prst="rect">
+            <a:avLst/>
+          </a:prstGeom>
+          <a:noFill/>
+        </p:spPr>
+        <p:txBody>
+          <a:bodyPr wrap="square" rtlCol="0">
+            <a:spAutoFit/>
+          </a:bodyPr>
+          <a:lstStyle/>
+          <a:p>
+            <a:pPr algn="ctr"/>
+            <a:r>
+              <a:rPr lang="de-DE" dirty="0" err="1"/>
+              <a:t>ConvBlock</a:t>
+            </a:r>
+            <a:endParaRPr lang="en-US" dirty="0"/>
+          </a:p>
+        </p:txBody>
+      </p:sp>
+      <p:sp>
+        <p:nvSpPr>
+          <p:cNvPr id="64" name="Rectangle: Rounded Corners 67">
+            <a:extLst>
+              <a:ext uri="{FF2B5EF4-FFF2-40B4-BE49-F238E27FC236}">
+                <a16:creationId xmlns:a16="http://schemas.microsoft.com/office/drawing/2014/main" id="{24C89A9A-0DC2-6321-73C2-B3D011828854}"/>
+              </a:ext>
+            </a:extLst>
+          </p:cNvPr>
+          <p:cNvSpPr/>
+          <p:nvPr/>
+        </p:nvSpPr>
+        <p:spPr>
+          <a:xfrm>
+            <a:off x="6351583" y="2537522"/>
+            <a:ext cx="303807" cy="2165173"/>
+          </a:xfrm>
+          <a:prstGeom prst="roundRect">
+            <a:avLst/>
+          </a:prstGeom>
+          <a:solidFill>
+            <a:schemeClr val="accent4">
+              <a:lumMod val="40000"/>
+              <a:lumOff val="60000"/>
+            </a:schemeClr>
+          </a:solidFill>
+          <a:ln>
+            <a:noFill/>
+          </a:ln>
+        </p:spPr>
+        <p:style>
+          <a:lnRef idx="2">
+            <a:schemeClr val="accent1">
+              <a:shade val="15000"/>
+            </a:schemeClr>
+          </a:lnRef>
+          <a:fillRef idx="1">
+            <a:schemeClr val="accent1"/>
+          </a:fillRef>
+          <a:effectRef idx="0">
+            <a:schemeClr val="accent1"/>
+          </a:effectRef>
+          <a:fontRef idx="minor">
+            <a:schemeClr val="lt1"/>
+          </a:fontRef>
+        </p:style>
+        <p:txBody>
+          <a:bodyPr rtlCol="0" anchor="ctr"/>
+          <a:lstStyle/>
+          <a:p>
+            <a:pPr algn="ctr"/>
+            <a:endParaRPr lang="en-US" dirty="0">
+              <a:solidFill>
+                <a:schemeClr val="accent1">
+                  <a:lumMod val="40000"/>
+                  <a:lumOff val="60000"/>
+                </a:schemeClr>
+              </a:solidFill>
+            </a:endParaRPr>
+          </a:p>
+        </p:txBody>
+      </p:sp>
+      <p:sp>
+        <p:nvSpPr>
+          <p:cNvPr id="65" name="TextBox 64">
+            <a:extLst>
+              <a:ext uri="{FF2B5EF4-FFF2-40B4-BE49-F238E27FC236}">
+                <a16:creationId xmlns:a16="http://schemas.microsoft.com/office/drawing/2014/main" id="{AC2E33F3-5BF5-F317-BB21-28B2CB9B16C3}"/>
+              </a:ext>
+            </a:extLst>
+          </p:cNvPr>
+          <p:cNvSpPr txBox="1"/>
+          <p:nvPr/>
+        </p:nvSpPr>
+        <p:spPr>
+          <a:xfrm rot="16200000">
+            <a:off x="5707809" y="3435441"/>
+            <a:ext cx="1591355" cy="369332"/>
+          </a:xfrm>
+          <a:prstGeom prst="rect">
+            <a:avLst/>
+          </a:prstGeom>
+          <a:noFill/>
+        </p:spPr>
+        <p:txBody>
+          <a:bodyPr wrap="square" rtlCol="0">
+            <a:spAutoFit/>
+          </a:bodyPr>
+          <a:lstStyle/>
+          <a:p>
+            <a:pPr algn="ctr"/>
+            <a:r>
+              <a:rPr lang="de-DE" dirty="0"/>
+              <a:t>ID Block x 5</a:t>
+            </a:r>
+            <a:endParaRPr lang="en-US" dirty="0"/>
+          </a:p>
+        </p:txBody>
+      </p:sp>
+      <p:sp>
+        <p:nvSpPr>
+          <p:cNvPr id="66" name="Rectangle: Rounded Corners 63">
+            <a:extLst>
+              <a:ext uri="{FF2B5EF4-FFF2-40B4-BE49-F238E27FC236}">
+                <a16:creationId xmlns:a16="http://schemas.microsoft.com/office/drawing/2014/main" id="{B210B0B2-BC65-CFBC-BE93-B0E7CDC7A5DC}"/>
+              </a:ext>
+            </a:extLst>
+          </p:cNvPr>
+          <p:cNvSpPr/>
+          <p:nvPr/>
+        </p:nvSpPr>
+        <p:spPr>
+          <a:xfrm>
+            <a:off x="7183243" y="2525249"/>
+            <a:ext cx="303807" cy="2165173"/>
+          </a:xfrm>
+          <a:prstGeom prst="roundRect">
+            <a:avLst/>
+          </a:prstGeom>
+          <a:solidFill>
+            <a:schemeClr val="accent5">
+              <a:lumMod val="40000"/>
+              <a:lumOff val="60000"/>
+            </a:schemeClr>
+          </a:solidFill>
+          <a:ln>
+            <a:solidFill>
+              <a:schemeClr val="accent5">
+                <a:lumMod val="40000"/>
+                <a:lumOff val="60000"/>
+              </a:schemeClr>
+            </a:solidFill>
+          </a:ln>
+        </p:spPr>
+        <p:style>
+          <a:lnRef idx="2">
+            <a:schemeClr val="accent1">
+              <a:shade val="15000"/>
+            </a:schemeClr>
+          </a:lnRef>
+          <a:fillRef idx="1">
+            <a:schemeClr val="accent1"/>
+          </a:fillRef>
+          <a:effectRef idx="0">
+            <a:schemeClr val="accent1"/>
+          </a:effectRef>
+          <a:fontRef idx="minor">
+            <a:schemeClr val="lt1"/>
+          </a:fontRef>
+        </p:style>
+        <p:txBody>
+          <a:bodyPr rtlCol="0" anchor="ctr"/>
+          <a:lstStyle/>
+          <a:p>
+            <a:pPr algn="ctr"/>
+            <a:endParaRPr lang="en-US" dirty="0"/>
+          </a:p>
+        </p:txBody>
+      </p:sp>
+      <p:sp>
+        <p:nvSpPr>
+          <p:cNvPr id="67" name="TextBox 66">
+            <a:extLst>
+              <a:ext uri="{FF2B5EF4-FFF2-40B4-BE49-F238E27FC236}">
+                <a16:creationId xmlns:a16="http://schemas.microsoft.com/office/drawing/2014/main" id="{F1CCAD64-43F1-9ED6-5A81-6F3CE2F4568D}"/>
+              </a:ext>
+            </a:extLst>
+          </p:cNvPr>
+          <p:cNvSpPr txBox="1"/>
+          <p:nvPr/>
+        </p:nvSpPr>
+        <p:spPr>
+          <a:xfrm rot="16200000">
+            <a:off x="6682537" y="3468857"/>
+            <a:ext cx="1305218" cy="369332"/>
+          </a:xfrm>
+          <a:prstGeom prst="rect">
+            <a:avLst/>
+          </a:prstGeom>
+          <a:noFill/>
+        </p:spPr>
+        <p:txBody>
+          <a:bodyPr wrap="square" rtlCol="0">
+            <a:spAutoFit/>
+          </a:bodyPr>
+          <a:lstStyle/>
+          <a:p>
+            <a:pPr algn="ctr"/>
+            <a:r>
+              <a:rPr lang="de-DE" dirty="0" err="1"/>
+              <a:t>ConvBlock</a:t>
+            </a:r>
+            <a:endParaRPr lang="en-US" dirty="0"/>
+          </a:p>
+        </p:txBody>
+      </p:sp>
+      <p:sp>
+        <p:nvSpPr>
+          <p:cNvPr id="68" name="Rectangle: Rounded Corners 67">
+            <a:extLst>
+              <a:ext uri="{FF2B5EF4-FFF2-40B4-BE49-F238E27FC236}">
+                <a16:creationId xmlns:a16="http://schemas.microsoft.com/office/drawing/2014/main" id="{2F3B0E18-83E8-9140-0A64-9F9622C642E9}"/>
+              </a:ext>
+            </a:extLst>
+          </p:cNvPr>
+          <p:cNvSpPr/>
+          <p:nvPr/>
+        </p:nvSpPr>
+        <p:spPr>
+          <a:xfrm>
+            <a:off x="7591713" y="2537522"/>
+            <a:ext cx="303807" cy="2165173"/>
+          </a:xfrm>
+          <a:prstGeom prst="roundRect">
+            <a:avLst/>
+          </a:prstGeom>
+          <a:solidFill>
+            <a:schemeClr val="accent4">
+              <a:lumMod val="40000"/>
+              <a:lumOff val="60000"/>
+            </a:schemeClr>
+          </a:solidFill>
+          <a:ln>
+            <a:noFill/>
+          </a:ln>
+        </p:spPr>
+        <p:style>
+          <a:lnRef idx="2">
+            <a:schemeClr val="accent1">
+              <a:shade val="15000"/>
+            </a:schemeClr>
+          </a:lnRef>
+          <a:fillRef idx="1">
+            <a:schemeClr val="accent1"/>
+          </a:fillRef>
+          <a:effectRef idx="0">
+            <a:schemeClr val="accent1"/>
+          </a:effectRef>
+          <a:fontRef idx="minor">
+            <a:schemeClr val="lt1"/>
+          </a:fontRef>
+        </p:style>
+        <p:txBody>
+          <a:bodyPr rtlCol="0" anchor="ctr"/>
+          <a:lstStyle/>
+          <a:p>
+            <a:pPr algn="ctr"/>
+            <a:endParaRPr lang="en-US" dirty="0">
+              <a:solidFill>
+                <a:schemeClr val="accent1">
+                  <a:lumMod val="40000"/>
+                  <a:lumOff val="60000"/>
+                </a:schemeClr>
+              </a:solidFill>
+            </a:endParaRPr>
+          </a:p>
+        </p:txBody>
+      </p:sp>
+      <p:sp>
+        <p:nvSpPr>
+          <p:cNvPr id="69" name="TextBox 68">
+            <a:extLst>
+              <a:ext uri="{FF2B5EF4-FFF2-40B4-BE49-F238E27FC236}">
+                <a16:creationId xmlns:a16="http://schemas.microsoft.com/office/drawing/2014/main" id="{5A7CD117-C0DA-A097-5B0D-69FFD78A20C6}"/>
+              </a:ext>
+            </a:extLst>
+          </p:cNvPr>
+          <p:cNvSpPr txBox="1"/>
+          <p:nvPr/>
+        </p:nvSpPr>
+        <p:spPr>
+          <a:xfrm rot="16200000">
+            <a:off x="6947939" y="3435441"/>
+            <a:ext cx="1591355" cy="369332"/>
+          </a:xfrm>
+          <a:prstGeom prst="rect">
+            <a:avLst/>
+          </a:prstGeom>
+          <a:noFill/>
+        </p:spPr>
+        <p:txBody>
+          <a:bodyPr wrap="square" rtlCol="0">
+            <a:spAutoFit/>
+          </a:bodyPr>
+          <a:lstStyle/>
+          <a:p>
+            <a:pPr algn="ctr"/>
+            <a:r>
+              <a:rPr lang="de-DE" dirty="0"/>
+              <a:t>ID Block x 2</a:t>
+            </a:r>
+            <a:endParaRPr lang="en-US" dirty="0"/>
+          </a:p>
+        </p:txBody>
+      </p:sp>
+      <p:sp>
+        <p:nvSpPr>
+          <p:cNvPr id="70" name="Rectangle: Rounded Corners 20">
+            <a:extLst>
+              <a:ext uri="{FF2B5EF4-FFF2-40B4-BE49-F238E27FC236}">
+                <a16:creationId xmlns:a16="http://schemas.microsoft.com/office/drawing/2014/main" id="{0BDA85B3-0196-1221-E2A9-1524E25DC219}"/>
+              </a:ext>
+            </a:extLst>
+          </p:cNvPr>
+          <p:cNvSpPr/>
+          <p:nvPr/>
+        </p:nvSpPr>
+        <p:spPr>
+          <a:xfrm>
+            <a:off x="8920602" y="2539219"/>
+            <a:ext cx="303807" cy="2165173"/>
+          </a:xfrm>
+          <a:prstGeom prst="roundRect">
+            <a:avLst/>
+          </a:prstGeom>
+          <a:solidFill>
+            <a:schemeClr val="accent5">
+              <a:lumMod val="40000"/>
+              <a:lumOff val="60000"/>
+            </a:schemeClr>
+          </a:solidFill>
+          <a:ln>
+            <a:solidFill>
+              <a:schemeClr val="accent5">
+                <a:lumMod val="40000"/>
+                <a:lumOff val="60000"/>
+              </a:schemeClr>
+            </a:solidFill>
+          </a:ln>
+        </p:spPr>
+        <p:style>
+          <a:lnRef idx="2">
+            <a:schemeClr val="accent1">
+              <a:shade val="15000"/>
+            </a:schemeClr>
+          </a:lnRef>
+          <a:fillRef idx="1">
+            <a:schemeClr val="accent1"/>
+          </a:fillRef>
+          <a:effectRef idx="0">
+            <a:schemeClr val="accent1"/>
+          </a:effectRef>
+          <a:fontRef idx="minor">
+            <a:schemeClr val="lt1"/>
+          </a:fontRef>
+        </p:style>
+        <p:txBody>
+          <a:bodyPr rtlCol="0" anchor="ctr"/>
+          <a:lstStyle/>
+          <a:p>
+            <a:pPr algn="ctr"/>
+            <a:endParaRPr lang="en-US" dirty="0"/>
+          </a:p>
+        </p:txBody>
+      </p:sp>
+      <p:sp>
+        <p:nvSpPr>
+          <p:cNvPr id="71" name="TextBox 70">
+            <a:extLst>
+              <a:ext uri="{FF2B5EF4-FFF2-40B4-BE49-F238E27FC236}">
+                <a16:creationId xmlns:a16="http://schemas.microsoft.com/office/drawing/2014/main" id="{045AED00-73B9-4B13-552F-AB05CF276679}"/>
+              </a:ext>
+            </a:extLst>
+          </p:cNvPr>
+          <p:cNvSpPr txBox="1"/>
+          <p:nvPr/>
+        </p:nvSpPr>
+        <p:spPr>
+          <a:xfrm rot="16200000">
+            <a:off x="8134145" y="3437139"/>
+            <a:ext cx="1889722" cy="369332"/>
+          </a:xfrm>
+          <a:prstGeom prst="rect">
+            <a:avLst/>
+          </a:prstGeom>
+          <a:noFill/>
+        </p:spPr>
+        <p:txBody>
+          <a:bodyPr wrap="square" rtlCol="0">
+            <a:spAutoFit/>
+          </a:bodyPr>
+          <a:lstStyle/>
+          <a:p>
+            <a:pPr algn="ctr"/>
+            <a:r>
+              <a:rPr lang="de-DE" dirty="0" err="1"/>
+              <a:t>Flattem</a:t>
+            </a:r>
+            <a:endParaRPr lang="en-US" dirty="0"/>
+          </a:p>
+        </p:txBody>
+      </p:sp>
+      <p:sp>
+        <p:nvSpPr>
+          <p:cNvPr id="72" name="Rectangle: Rounded Corners 20">
+            <a:extLst>
+              <a:ext uri="{FF2B5EF4-FFF2-40B4-BE49-F238E27FC236}">
+                <a16:creationId xmlns:a16="http://schemas.microsoft.com/office/drawing/2014/main" id="{3921A927-EEF5-1754-95AC-8CB0C82747BB}"/>
+              </a:ext>
+            </a:extLst>
+          </p:cNvPr>
+          <p:cNvSpPr/>
+          <p:nvPr/>
+        </p:nvSpPr>
+        <p:spPr>
+          <a:xfrm>
+            <a:off x="8486566" y="2549218"/>
+            <a:ext cx="303807" cy="2165173"/>
+          </a:xfrm>
+          <a:prstGeom prst="roundRect">
+            <a:avLst/>
+          </a:prstGeom>
+          <a:solidFill>
+            <a:schemeClr val="accent2">
+              <a:lumMod val="40000"/>
+              <a:lumOff val="60000"/>
+            </a:schemeClr>
+          </a:solidFill>
+          <a:ln>
+            <a:solidFill>
+              <a:schemeClr val="accent2">
+                <a:lumMod val="40000"/>
+                <a:lumOff val="60000"/>
+              </a:schemeClr>
+            </a:solidFill>
+          </a:ln>
+        </p:spPr>
+        <p:style>
+          <a:lnRef idx="2">
+            <a:schemeClr val="accent1">
+              <a:shade val="15000"/>
+            </a:schemeClr>
+          </a:lnRef>
+          <a:fillRef idx="1">
+            <a:schemeClr val="accent1"/>
+          </a:fillRef>
+          <a:effectRef idx="0">
+            <a:schemeClr val="accent1"/>
+          </a:effectRef>
+          <a:fontRef idx="minor">
+            <a:schemeClr val="lt1"/>
+          </a:fontRef>
+        </p:style>
+        <p:txBody>
+          <a:bodyPr rtlCol="0" anchor="ctr"/>
+          <a:lstStyle/>
+          <a:p>
+            <a:pPr algn="ctr"/>
+            <a:endParaRPr lang="en-US" dirty="0"/>
+          </a:p>
+        </p:txBody>
+      </p:sp>
+      <p:sp>
+        <p:nvSpPr>
+          <p:cNvPr id="73" name="TextBox 72">
+            <a:extLst>
+              <a:ext uri="{FF2B5EF4-FFF2-40B4-BE49-F238E27FC236}">
+                <a16:creationId xmlns:a16="http://schemas.microsoft.com/office/drawing/2014/main" id="{F602CC64-0225-1B05-CB75-91645B49F2BB}"/>
+              </a:ext>
+            </a:extLst>
+          </p:cNvPr>
+          <p:cNvSpPr txBox="1"/>
+          <p:nvPr/>
+        </p:nvSpPr>
+        <p:spPr>
+          <a:xfrm rot="16200000">
+            <a:off x="7700109" y="3447138"/>
+            <a:ext cx="1889722" cy="369332"/>
+          </a:xfrm>
+          <a:prstGeom prst="rect">
+            <a:avLst/>
+          </a:prstGeom>
+          <a:noFill/>
+        </p:spPr>
+        <p:txBody>
+          <a:bodyPr wrap="square" rtlCol="0">
+            <a:spAutoFit/>
+          </a:bodyPr>
+          <a:lstStyle/>
+          <a:p>
+            <a:pPr algn="ctr"/>
+            <a:r>
+              <a:rPr lang="de-DE" dirty="0" err="1"/>
+              <a:t>AveragePooling</a:t>
+            </a:r>
+            <a:endParaRPr lang="en-US" dirty="0"/>
           </a:p>
         </p:txBody>
       </p:sp>
     </p:spTree>
     <p:extLst>
       <p:ext uri="{BB962C8B-B14F-4D97-AF65-F5344CB8AC3E}">
-        <p14:creationId xmlns:p14="http://schemas.microsoft.com/office/powerpoint/2010/main" val="2159325909"/>
+        <p14:creationId xmlns:p14="http://schemas.microsoft.com/office/powerpoint/2010/main" val="1547017600"/>
       </p:ext>
     </p:extLst>
   </p:cSld>

</xml_diff>